<commit_message>
dec 2016 ppt v1.01
</commit_message>
<xml_diff>
--- a/null-meet-pune-dec-2016-Ransomware-3E.pptx
+++ b/null-meet-pune-dec-2016-Ransomware-3E.pptx
@@ -936,11 +936,7 @@
             </a:r>
             <a:r>
               <a:rPr lang="en-US" baseline="0" dirty="0" smtClean="0"/>
-              <a:t>e </a:t>
-            </a:r>
-            <a:r>
-              <a:rPr lang="en-US" baseline="0" dirty="0" smtClean="0"/>
-              <a:t>variants have evolved. </a:t>
+              <a:t>e variants have evolved. </a:t>
             </a:r>
           </a:p>
           <a:p>
@@ -1828,14 +1824,14 @@
               <a:defRPr/>
             </a:pPr>
             <a:r>
-              <a:rPr lang="en-US" dirty="0" smtClean="0"/>
+              <a:rPr lang="en-US" sz="1000" dirty="0" smtClean="0"/>
               <a:t>Almost</a:t>
             </a:r>
             <a:r>
-              <a:rPr lang="en-US" baseline="0" dirty="0" smtClean="0"/>
+              <a:rPr lang="en-US" sz="1000" baseline="0" dirty="0" smtClean="0"/>
               <a:t> all AV vendors have some ransomware recovery.</a:t>
             </a:r>
-            <a:endParaRPr lang="en-US" dirty="0" smtClean="0"/>
+            <a:endParaRPr lang="en-US" sz="1000" dirty="0" smtClean="0"/>
           </a:p>
           <a:p>
             <a:pPr marL="0" marR="0" lvl="0" indent="0" algn="l" defTabSz="914400" rtl="0" eaLnBrk="1" fontAlgn="auto" latinLnBrk="0" hangingPunct="1">
@@ -1856,51 +1852,51 @@
               <a:defRPr/>
             </a:pPr>
             <a:r>
-              <a:rPr lang="en-US" baseline="0" dirty="0" smtClean="0"/>
+              <a:rPr lang="en-US" sz="1000" baseline="0" dirty="0" smtClean="0"/>
               <a:t>Not all versions are </a:t>
             </a:r>
             <a:r>
-              <a:rPr lang="en-US" baseline="0" dirty="0" err="1" smtClean="0"/>
+              <a:rPr lang="en-US" sz="1000" baseline="0" dirty="0" err="1" smtClean="0"/>
               <a:t>decryptable</a:t>
             </a:r>
             <a:r>
-              <a:rPr lang="en-US" baseline="0" dirty="0" smtClean="0"/>
+              <a:rPr lang="en-US" sz="1000" baseline="0" dirty="0" smtClean="0"/>
               <a:t>.</a:t>
             </a:r>
-            <a:endParaRPr lang="en-US" dirty="0" smtClean="0"/>
-          </a:p>
-          <a:p>
-            <a:r>
-              <a:rPr lang="en-US" dirty="0" err="1" smtClean="0"/>
+            <a:endParaRPr lang="en-US" sz="1000" dirty="0" smtClean="0"/>
+          </a:p>
+          <a:p>
+            <a:r>
+              <a:rPr lang="en-US" sz="1000" dirty="0" err="1" smtClean="0"/>
               <a:t>NoMoreRansom</a:t>
             </a:r>
             <a:r>
-              <a:rPr lang="en-US" dirty="0" smtClean="0"/>
+              <a:rPr lang="en-US" sz="1000" dirty="0" smtClean="0"/>
               <a:t>:</a:t>
             </a:r>
             <a:r>
-              <a:rPr lang="en-US" baseline="0" dirty="0" smtClean="0"/>
+              <a:rPr lang="en-US" sz="1000" baseline="0" dirty="0" smtClean="0"/>
               <a:t> Kaspersky, Intel, Law Enforcement </a:t>
             </a:r>
           </a:p>
           <a:p>
             <a:r>
-              <a:rPr lang="en-US" baseline="0" dirty="0" smtClean="0"/>
+              <a:rPr lang="en-US" sz="1000" baseline="0" dirty="0" smtClean="0"/>
               <a:t>Recover Tools: </a:t>
             </a:r>
             <a:r>
-              <a:rPr lang="en-US" baseline="0" dirty="0" err="1" smtClean="0"/>
+              <a:rPr lang="en-US" sz="1000" baseline="0" dirty="0" err="1" smtClean="0"/>
               <a:t>TestDisk</a:t>
             </a:r>
             <a:r>
-              <a:rPr lang="en-US" baseline="0" dirty="0" smtClean="0"/>
+              <a:rPr lang="en-US" sz="1000" baseline="0" dirty="0" smtClean="0"/>
               <a:t>. </a:t>
             </a:r>
             <a:r>
-              <a:rPr lang="en-US" baseline="0" dirty="0" err="1" smtClean="0"/>
+              <a:rPr lang="en-US" sz="1000" baseline="0" dirty="0" err="1" smtClean="0"/>
               <a:t>Recuva</a:t>
             </a:r>
-            <a:endParaRPr lang="en-US" dirty="0"/>
+            <a:endParaRPr lang="en-US" sz="1000" dirty="0"/>
           </a:p>
         </p:txBody>
       </p:sp>
@@ -7252,7 +7248,6 @@
               <a:rPr lang="en-US" dirty="0" smtClean="0"/>
               <a:t>ps1</a:t>
             </a:r>
-            <a:endParaRPr lang="en-US" dirty="0" smtClean="0"/>
           </a:p>
           <a:p>
             <a:r>
@@ -7913,7 +7908,6 @@
               <a:rPr lang="en-US" dirty="0" smtClean="0"/>
               <a:t>Custom Packers</a:t>
             </a:r>
-            <a:endParaRPr lang="en-US" dirty="0" smtClean="0"/>
           </a:p>
           <a:p>
             <a:pPr lvl="1"/>
@@ -8774,11 +8768,7 @@
           <a:p>
             <a:r>
               <a:rPr lang="en-US" dirty="0" smtClean="0"/>
-              <a:t>Registry </a:t>
-            </a:r>
-            <a:r>
-              <a:rPr lang="en-US" dirty="0" smtClean="0"/>
-              <a:t>Entries</a:t>
+              <a:t>Registry Entries</a:t>
             </a:r>
           </a:p>
           <a:p>
@@ -8808,11 +8798,7 @@
           <a:p>
             <a:r>
               <a:rPr lang="en-US" dirty="0" smtClean="0"/>
-              <a:t>Encryption </a:t>
-            </a:r>
-            <a:r>
-              <a:rPr lang="en-US" dirty="0" smtClean="0"/>
-              <a:t>Key</a:t>
+              <a:t>Encryption Key</a:t>
             </a:r>
           </a:p>
           <a:p>
@@ -9561,11 +9547,7 @@
             <a:pPr lvl="1"/>
             <a:r>
               <a:rPr lang="en-US" dirty="0" smtClean="0"/>
-              <a:t>File </a:t>
-            </a:r>
-            <a:r>
-              <a:rPr lang="en-US" dirty="0" smtClean="0"/>
-              <a:t>Types</a:t>
+              <a:t>File Types</a:t>
             </a:r>
           </a:p>
           <a:p>
@@ -9590,7 +9572,6 @@
               <a:rPr lang="en-US" dirty="0" smtClean="0"/>
               <a:t>, jpg…</a:t>
             </a:r>
-            <a:endParaRPr lang="en-US" dirty="0" smtClean="0"/>
           </a:p>
           <a:p>
             <a:pPr lvl="1"/>
@@ -9615,7 +9596,6 @@
               <a:rPr lang="en-US" dirty="0" smtClean="0"/>
               <a:t>, crypt, locked, [random]…</a:t>
             </a:r>
-            <a:endParaRPr lang="en-US" dirty="0" smtClean="0"/>
           </a:p>
           <a:p>
             <a:r>
@@ -9651,7 +9631,6 @@
               <a:rPr lang="en-US" dirty="0" smtClean="0"/>
               <a:t>, .sys</a:t>
             </a:r>
-            <a:endParaRPr lang="en-US" dirty="0" smtClean="0"/>
           </a:p>
         </p:txBody>
       </p:sp>
@@ -11255,16 +11234,186 @@
           <a:chExt cx="0" cy="0"/>
         </a:xfrm>
       </p:grpSpPr>
+      <p:sp>
+        <p:nvSpPr>
+          <p:cNvPr id="2" name="Title 1"/>
+          <p:cNvSpPr>
+            <a:spLocks noGrp="1"/>
+          </p:cNvSpPr>
+          <p:nvPr>
+            <p:ph type="title"/>
+          </p:nvPr>
+        </p:nvSpPr>
+        <p:spPr/>
+        <p:txBody>
+          <a:bodyPr/>
+          <a:lstStyle/>
+          <a:p>
+            <a:r>
+              <a:rPr lang="en-US" dirty="0" smtClean="0"/>
+              <a:t>Recovery</a:t>
+            </a:r>
+            <a:endParaRPr lang="en-US" dirty="0"/>
+          </a:p>
+        </p:txBody>
+      </p:sp>
+      <p:sp>
+        <p:nvSpPr>
+          <p:cNvPr id="3" name="Content Placeholder 2"/>
+          <p:cNvSpPr>
+            <a:spLocks noGrp="1"/>
+          </p:cNvSpPr>
+          <p:nvPr>
+            <p:ph idx="1"/>
+          </p:nvPr>
+        </p:nvSpPr>
+        <p:spPr/>
+        <p:txBody>
+          <a:bodyPr>
+            <a:normAutofit/>
+          </a:bodyPr>
+          <a:lstStyle/>
+          <a:p>
+            <a:r>
+              <a:rPr lang="en-US" dirty="0" smtClean="0"/>
+              <a:t>Decryption/Eradication Tools</a:t>
+            </a:r>
+          </a:p>
+          <a:p>
+            <a:pPr lvl="1"/>
+            <a:r>
+              <a:rPr lang="en-US" dirty="0" smtClean="0">
+                <a:hlinkClick r:id="rId3"/>
+              </a:rPr>
+              <a:t>Kaspersky</a:t>
+            </a:r>
+            <a:endParaRPr lang="en-US" dirty="0" smtClean="0"/>
+          </a:p>
+          <a:p>
+            <a:pPr lvl="2"/>
+            <a:r>
+              <a:rPr lang="en-US" dirty="0" err="1" smtClean="0"/>
+              <a:t>WildFire</a:t>
+            </a:r>
+            <a:r>
+              <a:rPr lang="en-US" dirty="0" smtClean="0"/>
+              <a:t>, Shade, </a:t>
+            </a:r>
+            <a:r>
+              <a:rPr lang="en-US" dirty="0" err="1" smtClean="0"/>
+              <a:t>Rakhni</a:t>
+            </a:r>
+            <a:r>
+              <a:rPr lang="en-US" dirty="0" smtClean="0"/>
+              <a:t>, SMASH, </a:t>
+            </a:r>
+            <a:r>
+              <a:rPr lang="en-US" dirty="0" err="1" smtClean="0"/>
+              <a:t>CoinVault</a:t>
+            </a:r>
+            <a:r>
+              <a:rPr lang="en-US" dirty="0" smtClean="0"/>
+              <a:t>, XORIST…</a:t>
+            </a:r>
+          </a:p>
+          <a:p>
+            <a:pPr lvl="1"/>
+            <a:r>
+              <a:rPr lang="en-US" dirty="0" smtClean="0">
+                <a:hlinkClick r:id="rId4"/>
+              </a:rPr>
+              <a:t>TrendMicro</a:t>
+            </a:r>
+            <a:endParaRPr lang="en-US" dirty="0" smtClean="0"/>
+          </a:p>
+          <a:p>
+            <a:pPr lvl="2"/>
+            <a:r>
+              <a:rPr lang="en-US" dirty="0" err="1" smtClean="0"/>
+              <a:t>CryptXXX</a:t>
+            </a:r>
+            <a:r>
+              <a:rPr lang="en-US" dirty="0" smtClean="0"/>
+              <a:t>(1,2,3,4,5), </a:t>
+            </a:r>
+            <a:r>
+              <a:rPr lang="en-US" dirty="0" err="1" smtClean="0"/>
+              <a:t>Crysis</a:t>
+            </a:r>
+            <a:r>
+              <a:rPr lang="en-US" dirty="0" smtClean="0"/>
+              <a:t>, </a:t>
+            </a:r>
+            <a:r>
+              <a:rPr lang="en-US" dirty="0" err="1" smtClean="0"/>
+              <a:t>TeslaCrypt</a:t>
+            </a:r>
+            <a:r>
+              <a:rPr lang="en-US" dirty="0" smtClean="0"/>
+              <a:t>, </a:t>
+            </a:r>
+            <a:r>
+              <a:rPr lang="en-US" dirty="0" err="1" smtClean="0"/>
+              <a:t>Cerber</a:t>
+            </a:r>
+            <a:r>
+              <a:rPr lang="en-US" dirty="0" smtClean="0"/>
+              <a:t> V1, </a:t>
+            </a:r>
+            <a:r>
+              <a:rPr lang="en-US" dirty="0" err="1" smtClean="0"/>
+              <a:t>Nemucod</a:t>
+            </a:r>
+            <a:r>
+              <a:rPr lang="en-US" dirty="0" smtClean="0"/>
+              <a:t>…</a:t>
+            </a:r>
+          </a:p>
+          <a:p>
+            <a:pPr lvl="1"/>
+            <a:r>
+              <a:rPr lang="en-US" dirty="0">
+                <a:hlinkClick r:id="rId5"/>
+              </a:rPr>
+              <a:t>https://</a:t>
+            </a:r>
+            <a:r>
+              <a:rPr lang="en-US" dirty="0" smtClean="0">
+                <a:hlinkClick r:id="rId5"/>
+              </a:rPr>
+              <a:t>www.nomoreransom.org/decryption-tools.html</a:t>
+            </a:r>
+            <a:r>
+              <a:rPr lang="en-US" dirty="0" smtClean="0"/>
+              <a:t> </a:t>
+            </a:r>
+          </a:p>
+          <a:p>
+            <a:r>
+              <a:rPr lang="en-US" dirty="0" smtClean="0"/>
+              <a:t>Recovery tools</a:t>
+            </a:r>
+          </a:p>
+          <a:p>
+            <a:pPr lvl="1"/>
+            <a:r>
+              <a:rPr lang="en-US" dirty="0" err="1" smtClean="0"/>
+              <a:t>Photorec</a:t>
+            </a:r>
+            <a:endParaRPr lang="en-US" dirty="0" smtClean="0"/>
+          </a:p>
+        </p:txBody>
+      </p:sp>
       <p:pic>
         <p:nvPicPr>
-          <p:cNvPr id="6146" name="Picture 2" descr="http://www.keycloud.com/wp-content/uploads/2016/04/Backup-and-Recovery-Clouds.png"/>
+          <p:cNvPr id="1028" name="Picture 4" descr="http://www.filesaversdatarecovery.com/Images/desktop_computer_data_recovery.png"/>
           <p:cNvPicPr>
             <a:picLocks noChangeAspect="1" noChangeArrowheads="1"/>
           </p:cNvPicPr>
           <p:nvPr/>
         </p:nvPicPr>
         <p:blipFill>
-          <a:blip r:embed="rId3">
+          <a:blip r:embed="rId6">
             <a:extLst>
               <a:ext uri="{28A0092B-C50C-407E-A947-70E740481C1C}">
                 <a14:useLocalDpi xmlns:a14="http://schemas.microsoft.com/office/drawing/2010/main" val="0"/>
@@ -11278,8 +11427,8 @@
         </p:blipFill>
         <p:spPr bwMode="auto">
           <a:xfrm>
-            <a:off x="2530548" y="4791996"/>
-            <a:ext cx="6892972" cy="2402405"/>
+            <a:off x="3965945" y="4237896"/>
+            <a:ext cx="3783271" cy="2501337"/>
           </a:xfrm>
           <a:prstGeom prst="rect">
             <a:avLst/>
@@ -11296,176 +11445,6 @@
           </a:extLst>
         </p:spPr>
       </p:pic>
-      <p:sp>
-        <p:nvSpPr>
-          <p:cNvPr id="2" name="Title 1"/>
-          <p:cNvSpPr>
-            <a:spLocks noGrp="1"/>
-          </p:cNvSpPr>
-          <p:nvPr>
-            <p:ph type="title"/>
-          </p:nvPr>
-        </p:nvSpPr>
-        <p:spPr/>
-        <p:txBody>
-          <a:bodyPr/>
-          <a:lstStyle/>
-          <a:p>
-            <a:r>
-              <a:rPr lang="en-US" dirty="0" smtClean="0"/>
-              <a:t>Recovery</a:t>
-            </a:r>
-            <a:endParaRPr lang="en-US" dirty="0"/>
-          </a:p>
-        </p:txBody>
-      </p:sp>
-      <p:sp>
-        <p:nvSpPr>
-          <p:cNvPr id="3" name="Content Placeholder 2"/>
-          <p:cNvSpPr>
-            <a:spLocks noGrp="1"/>
-          </p:cNvSpPr>
-          <p:nvPr>
-            <p:ph idx="1"/>
-          </p:nvPr>
-        </p:nvSpPr>
-        <p:spPr/>
-        <p:txBody>
-          <a:bodyPr>
-            <a:normAutofit/>
-          </a:bodyPr>
-          <a:lstStyle/>
-          <a:p>
-            <a:r>
-              <a:rPr lang="en-US" dirty="0" smtClean="0"/>
-              <a:t>Decryption/Eradication Tools</a:t>
-            </a:r>
-          </a:p>
-          <a:p>
-            <a:pPr lvl="1"/>
-            <a:r>
-              <a:rPr lang="en-US" dirty="0" smtClean="0">
-                <a:hlinkClick r:id="rId4"/>
-              </a:rPr>
-              <a:t>Kaspersky</a:t>
-            </a:r>
-            <a:endParaRPr lang="en-US" dirty="0" smtClean="0"/>
-          </a:p>
-          <a:p>
-            <a:pPr lvl="2"/>
-            <a:r>
-              <a:rPr lang="en-US" dirty="0" err="1" smtClean="0"/>
-              <a:t>WildFire</a:t>
-            </a:r>
-            <a:r>
-              <a:rPr lang="en-US" dirty="0" smtClean="0"/>
-              <a:t>, Shade, </a:t>
-            </a:r>
-            <a:r>
-              <a:rPr lang="en-US" dirty="0" err="1" smtClean="0"/>
-              <a:t>Rakhni</a:t>
-            </a:r>
-            <a:r>
-              <a:rPr lang="en-US" dirty="0" smtClean="0"/>
-              <a:t>, SMASH, </a:t>
-            </a:r>
-            <a:r>
-              <a:rPr lang="en-US" dirty="0" err="1" smtClean="0"/>
-              <a:t>CoinVault</a:t>
-            </a:r>
-            <a:r>
-              <a:rPr lang="en-US" dirty="0" smtClean="0"/>
-              <a:t>, XORIST…</a:t>
-            </a:r>
-          </a:p>
-          <a:p>
-            <a:pPr lvl="1"/>
-            <a:r>
-              <a:rPr lang="en-US" dirty="0" smtClean="0">
-                <a:hlinkClick r:id="rId5"/>
-              </a:rPr>
-              <a:t>TrendMicro</a:t>
-            </a:r>
-            <a:endParaRPr lang="en-US" dirty="0" smtClean="0"/>
-          </a:p>
-          <a:p>
-            <a:pPr lvl="2"/>
-            <a:r>
-              <a:rPr lang="en-US" dirty="0" err="1" smtClean="0"/>
-              <a:t>CryptXXX</a:t>
-            </a:r>
-            <a:r>
-              <a:rPr lang="en-US" dirty="0" smtClean="0"/>
-              <a:t>(1,2,3,4,5), </a:t>
-            </a:r>
-            <a:r>
-              <a:rPr lang="en-US" dirty="0" err="1" smtClean="0"/>
-              <a:t>Crysis</a:t>
-            </a:r>
-            <a:r>
-              <a:rPr lang="en-US" dirty="0" smtClean="0"/>
-              <a:t>, </a:t>
-            </a:r>
-            <a:r>
-              <a:rPr lang="en-US" dirty="0" err="1" smtClean="0"/>
-              <a:t>TeslaCrypt</a:t>
-            </a:r>
-            <a:r>
-              <a:rPr lang="en-US" dirty="0" smtClean="0"/>
-              <a:t>, </a:t>
-            </a:r>
-            <a:r>
-              <a:rPr lang="en-US" dirty="0" err="1" smtClean="0"/>
-              <a:t>Cerber</a:t>
-            </a:r>
-            <a:r>
-              <a:rPr lang="en-US" dirty="0" smtClean="0"/>
-              <a:t> V1, </a:t>
-            </a:r>
-            <a:r>
-              <a:rPr lang="en-US" dirty="0" err="1" smtClean="0"/>
-              <a:t>Nemucod</a:t>
-            </a:r>
-            <a:r>
-              <a:rPr lang="en-US" dirty="0" smtClean="0"/>
-              <a:t>…</a:t>
-            </a:r>
-          </a:p>
-          <a:p>
-            <a:pPr lvl="1"/>
-            <a:r>
-              <a:rPr lang="en-US" dirty="0">
-                <a:hlinkClick r:id="rId6"/>
-              </a:rPr>
-              <a:t>https://</a:t>
-            </a:r>
-            <a:r>
-              <a:rPr lang="en-US" dirty="0" smtClean="0">
-                <a:hlinkClick r:id="rId6"/>
-              </a:rPr>
-              <a:t>www.nomoreransom.org/decryption-tools.html</a:t>
-            </a:r>
-            <a:r>
-              <a:rPr lang="en-US" dirty="0" smtClean="0"/>
-              <a:t> </a:t>
-            </a:r>
-          </a:p>
-          <a:p>
-            <a:r>
-              <a:rPr lang="en-US" dirty="0" smtClean="0"/>
-              <a:t>Recovery tools</a:t>
-            </a:r>
-          </a:p>
-          <a:p>
-            <a:pPr lvl="1"/>
-            <a:r>
-              <a:rPr lang="en-US" dirty="0" err="1" smtClean="0"/>
-              <a:t>Photorec</a:t>
-            </a:r>
-            <a:endParaRPr lang="en-US" dirty="0" smtClean="0"/>
-          </a:p>
-        </p:txBody>
-      </p:sp>
     </p:spTree>
     <p:extLst>
       <p:ext uri="{BB962C8B-B14F-4D97-AF65-F5344CB8AC3E}">
@@ -11912,9 +11891,118 @@
           <a:chExt cx="0" cy="0"/>
         </a:xfrm>
       </p:grpSpPr>
+      <p:sp>
+        <p:nvSpPr>
+          <p:cNvPr id="2" name="Title 1"/>
+          <p:cNvSpPr>
+            <a:spLocks noGrp="1"/>
+          </p:cNvSpPr>
+          <p:nvPr>
+            <p:ph type="title"/>
+          </p:nvPr>
+        </p:nvSpPr>
+        <p:spPr/>
+        <p:txBody>
+          <a:bodyPr/>
+          <a:lstStyle/>
+          <a:p>
+            <a:r>
+              <a:rPr lang="en-US" dirty="0" smtClean="0"/>
+              <a:t>Education</a:t>
+            </a:r>
+            <a:endParaRPr lang="en-US" dirty="0"/>
+          </a:p>
+        </p:txBody>
+      </p:sp>
+      <p:sp>
+        <p:nvSpPr>
+          <p:cNvPr id="3" name="Content Placeholder 2"/>
+          <p:cNvSpPr>
+            <a:spLocks noGrp="1"/>
+          </p:cNvSpPr>
+          <p:nvPr>
+            <p:ph idx="1"/>
+          </p:nvPr>
+        </p:nvSpPr>
+        <p:spPr/>
+        <p:txBody>
+          <a:bodyPr/>
+          <a:lstStyle/>
+          <a:p>
+            <a:r>
+              <a:rPr lang="en-US" dirty="0" smtClean="0"/>
+              <a:t>Avoid </a:t>
+            </a:r>
+            <a:r>
+              <a:rPr lang="en-US" dirty="0" smtClean="0"/>
+              <a:t>ransomware</a:t>
+            </a:r>
+          </a:p>
+          <a:p>
+            <a:pPr lvl="1"/>
+            <a:r>
+              <a:rPr lang="en-US" dirty="0" smtClean="0"/>
+              <a:t>Don’t click</a:t>
+            </a:r>
+            <a:endParaRPr lang="en-US" dirty="0" smtClean="0"/>
+          </a:p>
+          <a:p>
+            <a:r>
+              <a:rPr lang="en-US" dirty="0" smtClean="0"/>
+              <a:t>Unplug immediately</a:t>
+            </a:r>
+            <a:endParaRPr lang="en-US" dirty="0"/>
+          </a:p>
+          <a:p>
+            <a:r>
+              <a:rPr lang="en-US" dirty="0" smtClean="0"/>
+              <a:t>Don’t pay</a:t>
+            </a:r>
+          </a:p>
+          <a:p>
+            <a:r>
+              <a:rPr lang="en-US" dirty="0" smtClean="0"/>
+              <a:t>Backup</a:t>
+            </a:r>
+            <a:endParaRPr lang="en-US" dirty="0"/>
+          </a:p>
+          <a:p>
+            <a:pPr lvl="1"/>
+            <a:r>
+              <a:rPr lang="en-US" dirty="0"/>
+              <a:t>Disconnected</a:t>
+            </a:r>
+          </a:p>
+          <a:p>
+            <a:pPr lvl="1"/>
+            <a:r>
+              <a:rPr lang="en-US" dirty="0"/>
+              <a:t>Full </a:t>
+            </a:r>
+            <a:r>
+              <a:rPr lang="en-US" dirty="0" smtClean="0"/>
+              <a:t>Snapshots</a:t>
+            </a:r>
+          </a:p>
+          <a:p>
+            <a:pPr lvl="1"/>
+            <a:r>
+              <a:rPr lang="en-US" dirty="0" smtClean="0"/>
+              <a:t>Offline restoration</a:t>
+            </a:r>
+          </a:p>
+          <a:p>
+            <a:r>
+              <a:rPr lang="en-US" dirty="0" smtClean="0"/>
+              <a:t>Update</a:t>
+            </a:r>
+            <a:endParaRPr lang="en-US" dirty="0"/>
+          </a:p>
+        </p:txBody>
+      </p:sp>
       <p:pic>
         <p:nvPicPr>
-          <p:cNvPr id="9218" name="Picture 2" descr="http://kingofwallpapers.com/end/end-004.jpg"/>
+          <p:cNvPr id="2050" name="Picture 2" descr="http://www.90minds.com/wp-content/uploads/2013/06/no-backup.png"/>
           <p:cNvPicPr>
             <a:picLocks noChangeAspect="1" noChangeArrowheads="1"/>
           </p:cNvPicPr>
@@ -11935,8 +12023,8 @@
         </p:blipFill>
         <p:spPr bwMode="auto">
           <a:xfrm>
-            <a:off x="2580537" y="2508187"/>
-            <a:ext cx="5308822" cy="2986213"/>
+            <a:off x="4259742" y="2706798"/>
+            <a:ext cx="4485249" cy="3349920"/>
           </a:xfrm>
           <a:prstGeom prst="rect">
             <a:avLst/>
@@ -11953,99 +12041,6 @@
           </a:extLst>
         </p:spPr>
       </p:pic>
-      <p:sp>
-        <p:nvSpPr>
-          <p:cNvPr id="2" name="Title 1"/>
-          <p:cNvSpPr>
-            <a:spLocks noGrp="1"/>
-          </p:cNvSpPr>
-          <p:nvPr>
-            <p:ph type="title"/>
-          </p:nvPr>
-        </p:nvSpPr>
-        <p:spPr/>
-        <p:txBody>
-          <a:bodyPr/>
-          <a:lstStyle/>
-          <a:p>
-            <a:r>
-              <a:rPr lang="en-US" dirty="0"/>
-              <a:t>END</a:t>
-            </a:r>
-            <a:endParaRPr lang="en-US" dirty="0"/>
-          </a:p>
-        </p:txBody>
-      </p:sp>
-      <p:sp>
-        <p:nvSpPr>
-          <p:cNvPr id="3" name="Content Placeholder 2"/>
-          <p:cNvSpPr>
-            <a:spLocks noGrp="1"/>
-          </p:cNvSpPr>
-          <p:nvPr>
-            <p:ph idx="1"/>
-          </p:nvPr>
-        </p:nvSpPr>
-        <p:spPr/>
-        <p:txBody>
-          <a:bodyPr/>
-          <a:lstStyle/>
-          <a:p>
-            <a:r>
-              <a:rPr lang="en-US" dirty="0" smtClean="0"/>
-              <a:t>Avoid ransomware</a:t>
-            </a:r>
-          </a:p>
-          <a:p>
-            <a:r>
-              <a:rPr lang="en-US" dirty="0" smtClean="0"/>
-              <a:t>Unplug immediately</a:t>
-            </a:r>
-            <a:endParaRPr lang="en-US" dirty="0"/>
-          </a:p>
-          <a:p>
-            <a:r>
-              <a:rPr lang="en-US" dirty="0" smtClean="0"/>
-              <a:t>Don’t pay</a:t>
-            </a:r>
-          </a:p>
-          <a:p>
-            <a:r>
-              <a:rPr lang="en-US" dirty="0" smtClean="0"/>
-              <a:t>Backup</a:t>
-            </a:r>
-            <a:endParaRPr lang="en-US" dirty="0"/>
-          </a:p>
-          <a:p>
-            <a:pPr lvl="1"/>
-            <a:r>
-              <a:rPr lang="en-US" dirty="0"/>
-              <a:t>Disconnected</a:t>
-            </a:r>
-          </a:p>
-          <a:p>
-            <a:pPr lvl="1"/>
-            <a:r>
-              <a:rPr lang="en-US" dirty="0"/>
-              <a:t>Full </a:t>
-            </a:r>
-            <a:r>
-              <a:rPr lang="en-US" dirty="0" smtClean="0"/>
-              <a:t>Snapshots</a:t>
-            </a:r>
-          </a:p>
-          <a:p>
-            <a:pPr lvl="1"/>
-            <a:r>
-              <a:rPr lang="en-US" dirty="0" smtClean="0"/>
-              <a:t>Offline restoration</a:t>
-            </a:r>
-          </a:p>
-          <a:p>
-            <a:endParaRPr lang="en-US" dirty="0"/>
-          </a:p>
-        </p:txBody>
-      </p:sp>
     </p:spTree>
     <p:extLst>
       <p:ext uri="{BB962C8B-B14F-4D97-AF65-F5344CB8AC3E}">
@@ -12122,33 +12117,15 @@
                                   </p:childTnLst>
                                 </p:cTn>
                               </p:par>
-                            </p:childTnLst>
-                          </p:cTn>
-                        </p:par>
-                      </p:childTnLst>
-                    </p:cTn>
-                  </p:par>
-                  <p:par>
-                    <p:cTn id="8" fill="hold">
-                      <p:stCondLst>
-                        <p:cond delay="indefinite"/>
-                      </p:stCondLst>
-                      <p:childTnLst>
-                        <p:par>
-                          <p:cTn id="9" fill="hold">
-                            <p:stCondLst>
-                              <p:cond delay="0"/>
-                            </p:stCondLst>
-                            <p:childTnLst>
                               <p:par>
-                                <p:cTn id="10" presetID="10" presetClass="entr" presetSubtype="0" fill="hold" grpId="0" nodeType="clickEffect">
+                                <p:cTn id="8" presetID="10" presetClass="entr" presetSubtype="0" fill="hold" grpId="0" nodeType="withEffect">
                                   <p:stCondLst>
                                     <p:cond delay="0"/>
                                   </p:stCondLst>
                                   <p:childTnLst>
                                     <p:set>
                                       <p:cBhvr>
-                                        <p:cTn id="11" dur="1" fill="hold">
+                                        <p:cTn id="9" dur="1" fill="hold">
                                           <p:stCondLst>
                                             <p:cond delay="0"/>
                                           </p:stCondLst>
@@ -12170,7 +12147,7 @@
                                     </p:set>
                                     <p:animEffect transition="in" filter="fade">
                                       <p:cBhvr>
-                                        <p:cTn id="12" dur="500"/>
+                                        <p:cTn id="10" dur="500"/>
                                         <p:tgtEl>
                                           <p:spTgt spid="3">
                                             <p:txEl>
@@ -12190,26 +12167,26 @@
                     </p:cTn>
                   </p:par>
                   <p:par>
-                    <p:cTn id="13" fill="hold">
+                    <p:cTn id="11" fill="hold">
                       <p:stCondLst>
                         <p:cond delay="indefinite"/>
                       </p:stCondLst>
                       <p:childTnLst>
                         <p:par>
-                          <p:cTn id="14" fill="hold">
+                          <p:cTn id="12" fill="hold">
                             <p:stCondLst>
                               <p:cond delay="0"/>
                             </p:stCondLst>
                             <p:childTnLst>
                               <p:par>
-                                <p:cTn id="15" presetID="10" presetClass="entr" presetSubtype="0" fill="hold" grpId="0" nodeType="clickEffect">
+                                <p:cTn id="13" presetID="10" presetClass="entr" presetSubtype="0" fill="hold" grpId="0" nodeType="clickEffect">
                                   <p:stCondLst>
                                     <p:cond delay="0"/>
                                   </p:stCondLst>
                                   <p:childTnLst>
                                     <p:set>
                                       <p:cBhvr>
-                                        <p:cTn id="16" dur="1" fill="hold">
+                                        <p:cTn id="14" dur="1" fill="hold">
                                           <p:stCondLst>
                                             <p:cond delay="0"/>
                                           </p:stCondLst>
@@ -12231,7 +12208,7 @@
                                     </p:set>
                                     <p:animEffect transition="in" filter="fade">
                                       <p:cBhvr>
-                                        <p:cTn id="17" dur="500"/>
+                                        <p:cTn id="15" dur="500"/>
                                         <p:tgtEl>
                                           <p:spTgt spid="3">
                                             <p:txEl>
@@ -12251,26 +12228,26 @@
                     </p:cTn>
                   </p:par>
                   <p:par>
-                    <p:cTn id="18" fill="hold">
+                    <p:cTn id="16" fill="hold">
                       <p:stCondLst>
                         <p:cond delay="indefinite"/>
                       </p:stCondLst>
                       <p:childTnLst>
                         <p:par>
-                          <p:cTn id="19" fill="hold">
+                          <p:cTn id="17" fill="hold">
                             <p:stCondLst>
                               <p:cond delay="0"/>
                             </p:stCondLst>
                             <p:childTnLst>
                               <p:par>
-                                <p:cTn id="20" presetID="10" presetClass="entr" presetSubtype="0" fill="hold" grpId="0" nodeType="clickEffect">
+                                <p:cTn id="18" presetID="10" presetClass="entr" presetSubtype="0" fill="hold" grpId="0" nodeType="clickEffect">
                                   <p:stCondLst>
                                     <p:cond delay="0"/>
                                   </p:stCondLst>
                                   <p:childTnLst>
                                     <p:set>
                                       <p:cBhvr>
-                                        <p:cTn id="21" dur="1" fill="hold">
+                                        <p:cTn id="19" dur="1" fill="hold">
                                           <p:stCondLst>
                                             <p:cond delay="0"/>
                                           </p:stCondLst>
@@ -12292,7 +12269,7 @@
                                     </p:set>
                                     <p:animEffect transition="in" filter="fade">
                                       <p:cBhvr>
-                                        <p:cTn id="22" dur="500"/>
+                                        <p:cTn id="20" dur="500"/>
                                         <p:tgtEl>
                                           <p:spTgt spid="3">
                                             <p:txEl>
@@ -12305,8 +12282,26 @@
                                   </p:childTnLst>
                                 </p:cTn>
                               </p:par>
+                            </p:childTnLst>
+                          </p:cTn>
+                        </p:par>
+                      </p:childTnLst>
+                    </p:cTn>
+                  </p:par>
+                  <p:par>
+                    <p:cTn id="21" fill="hold">
+                      <p:stCondLst>
+                        <p:cond delay="indefinite"/>
+                      </p:stCondLst>
+                      <p:childTnLst>
+                        <p:par>
+                          <p:cTn id="22" fill="hold">
+                            <p:stCondLst>
+                              <p:cond delay="0"/>
+                            </p:stCondLst>
+                            <p:childTnLst>
                               <p:par>
-                                <p:cTn id="23" presetID="10" presetClass="entr" presetSubtype="0" fill="hold" grpId="0" nodeType="withEffect">
+                                <p:cTn id="23" presetID="10" presetClass="entr" presetSubtype="0" fill="hold" grpId="0" nodeType="clickEffect">
                                   <p:stCondLst>
                                     <p:cond delay="0"/>
                                   </p:stCondLst>
@@ -12426,6 +12421,110 @@
                                           <p:spTgt spid="3">
                                             <p:txEl>
                                               <p:pRg st="6" end="6"/>
+                                            </p:txEl>
+                                          </p:spTgt>
+                                        </p:tgtEl>
+                                      </p:cBhvr>
+                                    </p:animEffect>
+                                  </p:childTnLst>
+                                </p:cTn>
+                              </p:par>
+                              <p:par>
+                                <p:cTn id="32" presetID="10" presetClass="entr" presetSubtype="0" fill="hold" grpId="0" nodeType="withEffect">
+                                  <p:stCondLst>
+                                    <p:cond delay="0"/>
+                                  </p:stCondLst>
+                                  <p:childTnLst>
+                                    <p:set>
+                                      <p:cBhvr>
+                                        <p:cTn id="33" dur="1" fill="hold">
+                                          <p:stCondLst>
+                                            <p:cond delay="0"/>
+                                          </p:stCondLst>
+                                        </p:cTn>
+                                        <p:tgtEl>
+                                          <p:spTgt spid="3">
+                                            <p:txEl>
+                                              <p:pRg st="7" end="7"/>
+                                            </p:txEl>
+                                          </p:spTgt>
+                                        </p:tgtEl>
+                                        <p:attrNameLst>
+                                          <p:attrName>style.visibility</p:attrName>
+                                        </p:attrNameLst>
+                                      </p:cBhvr>
+                                      <p:to>
+                                        <p:strVal val="visible"/>
+                                      </p:to>
+                                    </p:set>
+                                    <p:animEffect transition="in" filter="fade">
+                                      <p:cBhvr>
+                                        <p:cTn id="34" dur="500"/>
+                                        <p:tgtEl>
+                                          <p:spTgt spid="3">
+                                            <p:txEl>
+                                              <p:pRg st="7" end="7"/>
+                                            </p:txEl>
+                                          </p:spTgt>
+                                        </p:tgtEl>
+                                      </p:cBhvr>
+                                    </p:animEffect>
+                                  </p:childTnLst>
+                                </p:cTn>
+                              </p:par>
+                            </p:childTnLst>
+                          </p:cTn>
+                        </p:par>
+                      </p:childTnLst>
+                    </p:cTn>
+                  </p:par>
+                  <p:par>
+                    <p:cTn id="35" fill="hold">
+                      <p:stCondLst>
+                        <p:cond delay="indefinite"/>
+                      </p:stCondLst>
+                      <p:childTnLst>
+                        <p:par>
+                          <p:cTn id="36" fill="hold">
+                            <p:stCondLst>
+                              <p:cond delay="0"/>
+                            </p:stCondLst>
+                            <p:childTnLst>
+                              <p:par>
+                                <p:cTn id="37" presetID="10" presetClass="entr" presetSubtype="0" fill="hold" grpId="0" nodeType="clickEffect">
+                                  <p:stCondLst>
+                                    <p:cond delay="0"/>
+                                  </p:stCondLst>
+                                  <p:childTnLst>
+                                    <p:set>
+                                      <p:cBhvr>
+                                        <p:cTn id="38" dur="1" fill="hold">
+                                          <p:stCondLst>
+                                            <p:cond delay="0"/>
+                                          </p:stCondLst>
+                                        </p:cTn>
+                                        <p:tgtEl>
+                                          <p:spTgt spid="3">
+                                            <p:txEl>
+                                              <p:pRg st="8" end="8"/>
+                                            </p:txEl>
+                                          </p:spTgt>
+                                        </p:tgtEl>
+                                        <p:attrNameLst>
+                                          <p:attrName>style.visibility</p:attrName>
+                                        </p:attrNameLst>
+                                      </p:cBhvr>
+                                      <p:to>
+                                        <p:strVal val="visible"/>
+                                      </p:to>
+                                    </p:set>
+                                    <p:animEffect transition="in" filter="fade">
+                                      <p:cBhvr>
+                                        <p:cTn id="39" dur="500"/>
+                                        <p:tgtEl>
+                                          <p:spTgt spid="3">
+                                            <p:txEl>
+                                              <p:pRg st="8" end="8"/>
                                             </p:txEl>
                                           </p:spTgt>
                                         </p:tgtEl>
@@ -12485,51 +12584,9 @@
           <a:chExt cx="0" cy="0"/>
         </a:xfrm>
       </p:grpSpPr>
-      <p:sp>
-        <p:nvSpPr>
-          <p:cNvPr id="2" name="Title 1"/>
-          <p:cNvSpPr>
-            <a:spLocks noGrp="1"/>
-          </p:cNvSpPr>
-          <p:nvPr>
-            <p:ph type="title"/>
-          </p:nvPr>
-        </p:nvSpPr>
-        <p:spPr/>
-        <p:txBody>
-          <a:bodyPr/>
-          <a:lstStyle/>
-          <a:p>
-            <a:endParaRPr lang="en-US" dirty="0"/>
-          </a:p>
-        </p:txBody>
-      </p:sp>
-      <p:sp>
-        <p:nvSpPr>
-          <p:cNvPr id="3" name="Content Placeholder 2"/>
-          <p:cNvSpPr>
-            <a:spLocks noGrp="1"/>
-          </p:cNvSpPr>
-          <p:nvPr>
-            <p:ph idx="1"/>
-          </p:nvPr>
-        </p:nvSpPr>
-        <p:spPr/>
-        <p:txBody>
-          <a:bodyPr/>
-          <a:lstStyle/>
-          <a:p>
-            <a:r>
-              <a:rPr lang="en-US" dirty="0" smtClean="0"/>
-              <a:t>Questions?</a:t>
-            </a:r>
-            <a:endParaRPr lang="en-US" dirty="0"/>
-          </a:p>
-        </p:txBody>
-      </p:sp>
       <p:pic>
         <p:nvPicPr>
-          <p:cNvPr id="5" name="Picture 2" descr="http://7te.org/images/570x363/pc-gamer-wallpaper-desktop-image-3734.jpg"/>
+          <p:cNvPr id="6" name="Picture 2" descr="http://kingofwallpapers.com/end/end-004.jpg"/>
           <p:cNvPicPr>
             <a:picLocks noChangeAspect="1" noChangeArrowheads="1"/>
           </p:cNvPicPr>
@@ -12550,7 +12607,67 @@
         </p:blipFill>
         <p:spPr bwMode="auto">
           <a:xfrm>
-            <a:off x="1857375" y="2581384"/>
+            <a:off x="3820891" y="0"/>
+            <a:ext cx="5308822" cy="2986213"/>
+          </a:xfrm>
+          <a:prstGeom prst="rect">
+            <a:avLst/>
+          </a:prstGeom>
+          <a:noFill/>
+          <a:extLst>
+            <a:ext uri="{909E8E84-426E-40DD-AFC4-6F175D3DCCD1}">
+              <a14:hiddenFill xmlns:a14="http://schemas.microsoft.com/office/drawing/2010/main">
+                <a:solidFill>
+                  <a:srgbClr val="FFFFFF"/>
+                </a:solidFill>
+              </a14:hiddenFill>
+            </a:ext>
+          </a:extLst>
+        </p:spPr>
+      </p:pic>
+      <p:sp>
+        <p:nvSpPr>
+          <p:cNvPr id="3" name="Content Placeholder 2"/>
+          <p:cNvSpPr>
+            <a:spLocks noGrp="1"/>
+          </p:cNvSpPr>
+          <p:nvPr>
+            <p:ph idx="1"/>
+          </p:nvPr>
+        </p:nvSpPr>
+        <p:spPr/>
+        <p:txBody>
+          <a:bodyPr/>
+          <a:lstStyle/>
+          <a:p>
+            <a:endParaRPr lang="en-US" dirty="0"/>
+          </a:p>
+        </p:txBody>
+      </p:sp>
+      <p:pic>
+        <p:nvPicPr>
+          <p:cNvPr id="5" name="Picture 2" descr="http://7te.org/images/570x363/pc-gamer-wallpaper-desktop-image-3734.jpg"/>
+          <p:cNvPicPr>
+            <a:picLocks noChangeAspect="1" noChangeArrowheads="1"/>
+          </p:cNvPicPr>
+          <p:nvPr/>
+        </p:nvPicPr>
+        <p:blipFill>
+          <a:blip r:embed="rId3">
+            <a:extLst>
+              <a:ext uri="{28A0092B-C50C-407E-A947-70E740481C1C}">
+                <a14:useLocalDpi xmlns:a14="http://schemas.microsoft.com/office/drawing/2010/main" val="0"/>
+              </a:ext>
+            </a:extLst>
+          </a:blip>
+          <a:srcRect/>
+          <a:stretch>
+            <a:fillRect/>
+          </a:stretch>
+        </p:blipFill>
+        <p:spPr bwMode="auto">
+          <a:xfrm>
+            <a:off x="1857375" y="3035521"/>
             <a:ext cx="5429250" cy="3457576"/>
           </a:xfrm>
           <a:prstGeom prst="rect">
@@ -12568,6 +12685,63 @@
           </a:extLst>
         </p:spPr>
       </p:pic>
+      <p:sp>
+        <p:nvSpPr>
+          <p:cNvPr id="7" name="Cloud Callout 6"/>
+          <p:cNvSpPr/>
+          <p:nvPr/>
+        </p:nvSpPr>
+        <p:spPr>
+          <a:xfrm>
+            <a:off x="5124892" y="3035521"/>
+            <a:ext cx="1967023" cy="868118"/>
+          </a:xfrm>
+          <a:prstGeom prst="cloudCallout">
+            <a:avLst>
+              <a:gd name="adj1" fmla="val -18872"/>
+              <a:gd name="adj2" fmla="val 96090"/>
+            </a:avLst>
+          </a:prstGeom>
+          <a:solidFill>
+            <a:schemeClr val="tx2">
+              <a:lumMod val="25000"/>
+            </a:schemeClr>
+          </a:solidFill>
+          <a:ln>
+            <a:solidFill>
+              <a:srgbClr val="FF0000"/>
+            </a:solidFill>
+          </a:ln>
+        </p:spPr>
+        <p:style>
+          <a:lnRef idx="2">
+            <a:schemeClr val="accent1">
+              <a:shade val="50000"/>
+            </a:schemeClr>
+          </a:lnRef>
+          <a:fillRef idx="1">
+            <a:schemeClr val="accent1"/>
+          </a:fillRef>
+          <a:effectRef idx="0">
+            <a:schemeClr val="accent1"/>
+          </a:effectRef>
+          <a:fontRef idx="minor">
+            <a:schemeClr val="lt1"/>
+          </a:fontRef>
+        </p:style>
+        <p:txBody>
+          <a:bodyPr rtlCol="0" anchor="ctr"/>
+          <a:lstStyle/>
+          <a:p>
+            <a:pPr algn="ctr"/>
+            <a:r>
+              <a:rPr lang="en-US" dirty="0" smtClean="0"/>
+              <a:t>Question?</a:t>
+            </a:r>
+            <a:endParaRPr lang="en-US" dirty="0"/>
+          </a:p>
+        </p:txBody>
+      </p:sp>
     </p:spTree>
     <p:extLst>
       <p:ext uri="{BB962C8B-B14F-4D97-AF65-F5344CB8AC3E}">

</xml_diff>